<commit_message>
Added more database support
</commit_message>
<xml_diff>
--- a/Documentation/CRCs.pptx
+++ b/Documentation/CRCs.pptx
@@ -7,9 +7,10 @@
   <p:sldIdLst>
     <p:sldId id="256" r:id="rId2"/>
     <p:sldId id="258" r:id="rId3"/>
-    <p:sldId id="259" r:id="rId4"/>
-    <p:sldId id="260" r:id="rId5"/>
-    <p:sldId id="261" r:id="rId6"/>
+    <p:sldId id="262" r:id="rId4"/>
+    <p:sldId id="259" r:id="rId5"/>
+    <p:sldId id="260" r:id="rId6"/>
+    <p:sldId id="261" r:id="rId7"/>
   </p:sldIdLst>
   <p:sldSz cx="12192000" cy="6858000"/>
   <p:notesSz cx="6858000" cy="9144000"/>
@@ -3136,9 +3137,20 @@
           <a:p>
             <a:r>
               <a:rPr lang="en-US" dirty="0" smtClean="0"/>
-              <a:t>Knows of event price</a:t>
-            </a:r>
-            <a:endParaRPr lang="en-US" dirty="0"/>
+              <a:t>knows of extra cost</a:t>
+            </a:r>
+          </a:p>
+          <a:p>
+            <a:r>
+              <a:rPr lang="en-US" dirty="0" smtClean="0"/>
+              <a:t>Knows if multiple client event</a:t>
+            </a:r>
+          </a:p>
+          <a:p>
+            <a:r>
+              <a:rPr lang="en-US" dirty="0" smtClean="0"/>
+              <a:t>Knows photographers</a:t>
+            </a:r>
           </a:p>
         </p:txBody>
       </p:sp>
@@ -3167,7 +3179,29 @@
           <a:bodyPr/>
           <a:lstStyle/>
           <a:p>
-            <a:endParaRPr lang="en-US" dirty="0"/>
+            <a:r>
+              <a:rPr lang="en-US" dirty="0" err="1" smtClean="0"/>
+              <a:t>EventType</a:t>
+            </a:r>
+            <a:endParaRPr lang="en-US" dirty="0" smtClean="0"/>
+          </a:p>
+          <a:p>
+            <a:r>
+              <a:rPr lang="en-US" dirty="0" smtClean="0"/>
+              <a:t>Timeline</a:t>
+            </a:r>
+          </a:p>
+          <a:p>
+            <a:r>
+              <a:rPr lang="en-US" dirty="0" smtClean="0"/>
+              <a:t>Location</a:t>
+            </a:r>
+          </a:p>
+          <a:p>
+            <a:r>
+              <a:rPr lang="en-US" dirty="0" smtClean="0"/>
+              <a:t>Photographer</a:t>
+            </a:r>
           </a:p>
         </p:txBody>
       </p:sp>
@@ -3228,7 +3262,7 @@
           <a:p>
             <a:r>
               <a:rPr lang="en-US" dirty="0" err="1" smtClean="0"/>
-              <a:t>EventManager</a:t>
+              <a:t>EventType</a:t>
             </a:r>
             <a:endParaRPr lang="en-US" dirty="0"/>
           </a:p>
@@ -3261,13 +3295,13 @@
           <a:p>
             <a:r>
               <a:rPr lang="en-US" dirty="0" smtClean="0"/>
-              <a:t>Fetches the event(s) from the database</a:t>
+              <a:t>Knows of base cost</a:t>
             </a:r>
           </a:p>
           <a:p>
             <a:r>
               <a:rPr lang="en-US" dirty="0" smtClean="0"/>
-              <a:t>Saves event(s) to the database</a:t>
+              <a:t>Knows of event title</a:t>
             </a:r>
             <a:endParaRPr lang="en-US" dirty="0"/>
           </a:p>
@@ -3298,10 +3332,6 @@
           <a:bodyPr/>
           <a:lstStyle/>
           <a:p>
-            <a:r>
-              <a:rPr lang="en-US" dirty="0" smtClean="0"/>
-              <a:t>Event</a:t>
-            </a:r>
             <a:endParaRPr lang="en-US" dirty="0"/>
           </a:p>
         </p:txBody>
@@ -3309,7 +3339,7 @@
     </p:spTree>
     <p:extLst>
       <p:ext uri="{BB962C8B-B14F-4D97-AF65-F5344CB8AC3E}">
-        <p14:creationId xmlns:p14="http://schemas.microsoft.com/office/powerpoint/2010/main" val="3821647550"/>
+        <p14:creationId xmlns:p14="http://schemas.microsoft.com/office/powerpoint/2010/main" val="822567634"/>
       </p:ext>
     </p:extLst>
   </p:cSld>
@@ -3363,6 +3393,141 @@
           <a:p>
             <a:r>
               <a:rPr lang="en-US" dirty="0" err="1" smtClean="0"/>
+              <a:t>EventManager</a:t>
+            </a:r>
+            <a:endParaRPr lang="en-US" dirty="0"/>
+          </a:p>
+        </p:txBody>
+      </p:sp>
+      <p:sp>
+        <p:nvSpPr>
+          <p:cNvPr id="5" name="Content Placeholder 4"/>
+          <p:cNvSpPr>
+            <a:spLocks noGrp="1"/>
+          </p:cNvSpPr>
+          <p:nvPr>
+            <p:ph sz="half" idx="1"/>
+          </p:nvPr>
+        </p:nvSpPr>
+        <p:spPr>
+          <a:xfrm>
+            <a:off x="0" y="1325563"/>
+            <a:ext cx="6089715" cy="5532437"/>
+          </a:xfrm>
+          <a:ln>
+            <a:solidFill>
+              <a:schemeClr val="tx1"/>
+            </a:solidFill>
+          </a:ln>
+        </p:spPr>
+        <p:txBody>
+          <a:bodyPr/>
+          <a:lstStyle/>
+          <a:p>
+            <a:r>
+              <a:rPr lang="en-US" dirty="0" smtClean="0"/>
+              <a:t>Fetches the event(s) from the database</a:t>
+            </a:r>
+          </a:p>
+          <a:p>
+            <a:r>
+              <a:rPr lang="en-US" dirty="0" smtClean="0"/>
+              <a:t>Saves event(s) to the database</a:t>
+            </a:r>
+            <a:endParaRPr lang="en-US" dirty="0"/>
+          </a:p>
+        </p:txBody>
+      </p:sp>
+      <p:sp>
+        <p:nvSpPr>
+          <p:cNvPr id="6" name="Content Placeholder 5"/>
+          <p:cNvSpPr>
+            <a:spLocks noGrp="1"/>
+          </p:cNvSpPr>
+          <p:nvPr>
+            <p:ph sz="half" idx="2"/>
+          </p:nvPr>
+        </p:nvSpPr>
+        <p:spPr>
+          <a:xfrm>
+            <a:off x="6089715" y="1325563"/>
+            <a:ext cx="6102285" cy="5532436"/>
+          </a:xfrm>
+          <a:ln>
+            <a:solidFill>
+              <a:schemeClr val="tx1"/>
+            </a:solidFill>
+          </a:ln>
+        </p:spPr>
+        <p:txBody>
+          <a:bodyPr/>
+          <a:lstStyle/>
+          <a:p>
+            <a:r>
+              <a:rPr lang="en-US" dirty="0" smtClean="0"/>
+              <a:t>Event</a:t>
+            </a:r>
+            <a:endParaRPr lang="en-US" dirty="0"/>
+          </a:p>
+        </p:txBody>
+      </p:sp>
+    </p:spTree>
+    <p:extLst>
+      <p:ext uri="{BB962C8B-B14F-4D97-AF65-F5344CB8AC3E}">
+        <p14:creationId xmlns:p14="http://schemas.microsoft.com/office/powerpoint/2010/main" val="3821647550"/>
+      </p:ext>
+    </p:extLst>
+  </p:cSld>
+  <p:clrMapOvr>
+    <a:masterClrMapping/>
+  </p:clrMapOvr>
+</p:sld>
+</file>
+
+<file path=ppt/slides/slide5.xml><?xml version="1.0" encoding="utf-8"?>
+<p:sld xmlns:a="http://schemas.openxmlformats.org/drawingml/2006/main" xmlns:r="http://schemas.openxmlformats.org/officeDocument/2006/relationships" xmlns:p="http://schemas.openxmlformats.org/presentationml/2006/main">
+  <p:cSld>
+    <p:spTree>
+      <p:nvGrpSpPr>
+        <p:cNvPr id="1" name=""/>
+        <p:cNvGrpSpPr/>
+        <p:nvPr/>
+      </p:nvGrpSpPr>
+      <p:grpSpPr>
+        <a:xfrm>
+          <a:off x="0" y="0"/>
+          <a:ext cx="0" cy="0"/>
+          <a:chOff x="0" y="0"/>
+          <a:chExt cx="0" cy="0"/>
+        </a:xfrm>
+      </p:grpSpPr>
+      <p:sp>
+        <p:nvSpPr>
+          <p:cNvPr id="4" name="Title 3"/>
+          <p:cNvSpPr>
+            <a:spLocks noGrp="1"/>
+          </p:cNvSpPr>
+          <p:nvPr>
+            <p:ph type="title"/>
+          </p:nvPr>
+        </p:nvSpPr>
+        <p:spPr>
+          <a:xfrm>
+            <a:off x="0" y="0"/>
+            <a:ext cx="12192000" cy="1325563"/>
+          </a:xfrm>
+          <a:ln>
+            <a:solidFill>
+              <a:schemeClr val="tx1"/>
+            </a:solidFill>
+          </a:ln>
+        </p:spPr>
+        <p:txBody>
+          <a:bodyPr/>
+          <a:lstStyle/>
+          <a:p>
+            <a:r>
+              <a:rPr lang="en-US" dirty="0" err="1" smtClean="0"/>
               <a:t>EventListController</a:t>
             </a:r>
             <a:endParaRPr lang="en-US" dirty="0"/>
@@ -3448,7 +3613,7 @@
 </p:sld>
 </file>
 
-<file path=ppt/slides/slide5.xml><?xml version="1.0" encoding="utf-8"?>
+<file path=ppt/slides/slide6.xml><?xml version="1.0" encoding="utf-8"?>
 <p:sld xmlns:a="http://schemas.openxmlformats.org/drawingml/2006/main" xmlns:r="http://schemas.openxmlformats.org/officeDocument/2006/relationships" xmlns:p="http://schemas.openxmlformats.org/presentationml/2006/main">
   <p:cSld>
     <p:spTree>

</xml_diff>